<commit_message>
Liam hugo does not exist
</commit_message>
<xml_diff>
--- a/argus-violet_poster.pptx
+++ b/argus-violet_poster.pptx
@@ -2469,12 +2469,8 @@
               <a:buChar char="-"/>
             </a:pPr>
             <a:r>
-              <a:rPr lang="en-AU"/>
-              <a:t>Three fingers up </a:t>
-            </a:r>
-            <a:r>
               <a:rPr lang="en-AU" dirty="0"/>
-              <a:t>– Moves Right</a:t>
+              <a:t>Three fingers up – Moves Right</a:t>
             </a:r>
           </a:p>
           <a:p>
@@ -2561,7 +2557,21 @@
                 <a:latin typeface="Helvetica Neue" charset="0"/>
                 <a:cs typeface="Helvetica Neue" charset="0"/>
               </a:rPr>
-              <a:t>, Archie Wills 47440188, Liam Hugo 4749048</a:t>
+              <a:t>, Archie Wills 47440188, </a:t>
+            </a:r>
+            <a:r>
+              <a:rPr lang="en-US">
+                <a:latin typeface="Helvetica Neue" charset="0"/>
+                <a:cs typeface="Helvetica Neue" charset="0"/>
+              </a:rPr>
+              <a:t>Liam Ryan </a:t>
+            </a:r>
+            <a:r>
+              <a:rPr lang="en-US" dirty="0">
+                <a:latin typeface="Helvetica Neue" charset="0"/>
+                <a:cs typeface="Helvetica Neue" charset="0"/>
+              </a:rPr>
+              <a:t>4749048</a:t>
             </a:r>
           </a:p>
         </p:txBody>

</xml_diff>